<commit_message>
bfg and agu poster
Former-commit-id: acc18792471460a8826a5f882752bb8ae0ec2cd5
</commit_message>
<xml_diff>
--- a/products/hollister_et_al_agu_present/hollister_agu_2024_poster_outline.pptx
+++ b/products/hollister_et_al_agu_present/hollister_agu_2024_poster_outline.pptx
@@ -3759,6 +3759,1466 @@
           </a:p>
         </p:txBody>
       </p:sp>
+      <p:graphicFrame>
+        <p:nvGraphicFramePr>
+          <p:cNvPr id="6" name="Content Placeholder 5"/>
+          <p:cNvGraphicFramePr>
+            <a:graphicFrameLocks noGrp="1"/>
+          </p:cNvGraphicFramePr>
+          <p:nvPr>
+            <p:ph idx="1"/>
+          </p:nvPr>
+        </p:nvGraphicFramePr>
+        <p:xfrm>
+          <a:off x="457200" y="1193800"/>
+          <a:ext cx="8229600" cy="3390900"/>
+        </p:xfrm>
+        <a:graphic>
+          <a:graphicData uri="http://schemas.openxmlformats.org/drawingml/2006/table">
+            <a:tbl>
+              <a:tblPr firstRow="1" bandRow="1">
+                <a:tableStyleId>{5C22544A-7EE6-4342-B048-85BDC9FD1C3A}</a:tableStyleId>
+              </a:tblPr>
+              <a:tblGrid>
+                <a:gridCol w="2057400"/>
+                <a:gridCol w="2057400"/>
+                <a:gridCol w="2057400"/>
+                <a:gridCol w="2057400"/>
+              </a:tblGrid>
+              <a:tr h="0">
+                <a:tc>
+                  <a:txBody>
+                    <a:bodyPr/>
+                    <a:lstStyle/>
+                    <a:p>
+                      <a:pPr lvl="0" indent="0" marL="0" algn="l">
+                        <a:buNone/>
+                      </a:pPr>
+                      <a:r>
+                        <a:rPr/>
+                        <a:t>source</a:t>
+                      </a:r>
+                    </a:p>
+                  </a:txBody>
+                  <a:tcPr/>
+                </a:tc>
+                <a:tc>
+                  <a:txBody>
+                    <a:bodyPr/>
+                    <a:lstStyle/>
+                    <a:p>
+                      <a:pPr lvl="0" indent="0" marL="0" algn="l">
+                        <a:buNone/>
+                      </a:pPr>
+                      <a:r>
+                        <a:rPr/>
+                        <a:t>type</a:t>
+                      </a:r>
+                    </a:p>
+                  </a:txBody>
+                  <a:tcPr/>
+                </a:tc>
+                <a:tc>
+                  <a:txBody>
+                    <a:bodyPr/>
+                    <a:lstStyle/>
+                    <a:p>
+                      <a:pPr lvl="0" indent="0" marL="0" algn="l">
+                        <a:buNone/>
+                      </a:pPr>
+                      <a:r>
+                        <a:rPr/>
+                        <a:t>variables</a:t>
+                      </a:r>
+                    </a:p>
+                  </a:txBody>
+                  <a:tcPr/>
+                </a:tc>
+                <a:tc>
+                  <a:txBody>
+                    <a:bodyPr/>
+                    <a:lstStyle/>
+                    <a:p>
+                      <a:pPr lvl="0" indent="0" marL="0" algn="l">
+                        <a:buNone/>
+                      </a:pPr>
+                      <a:r>
+                        <a:rPr/>
+                        <a:t>values</a:t>
+                      </a:r>
+                    </a:p>
+                  </a:txBody>
+                  <a:tcPr/>
+                </a:tc>
+              </a:tr>
+              <a:tr h="0">
+                <a:tc>
+                  <a:txBody>
+                    <a:bodyPr/>
+                    <a:lstStyle/>
+                    <a:p>
+                      <a:pPr lvl="0" indent="0" marL="0" algn="l">
+                        <a:buNone/>
+                      </a:pPr>
+                      <a:r>
+                        <a:rPr/>
+                        <a:t>lagos</a:t>
+                      </a:r>
+                    </a:p>
+                  </a:txBody>
+                </a:tc>
+                <a:tc>
+                  <a:txBody>
+                    <a:bodyPr/>
+                    <a:lstStyle/>
+                    <a:p>
+                      <a:pPr lvl="0" indent="0" marL="0" algn="l">
+                        <a:buNone/>
+                      </a:pPr>
+                      <a:r>
+                        <a:rPr/>
+                        <a:t>existing</a:t>
+                      </a:r>
+                    </a:p>
+                  </a:txBody>
+                </a:tc>
+                <a:tc>
+                  <a:txBody>
+                    <a:bodyPr/>
+                    <a:lstStyle/>
+                    <a:p>
+                      <a:pPr lvl="0" indent="0" marL="0" algn="l">
+                        <a:buNone/>
+                      </a:pPr>
+                      <a:r>
+                        <a:rPr/>
+                        <a:t>maxdepth</a:t>
+                      </a:r>
+                    </a:p>
+                  </a:txBody>
+                </a:tc>
+                <a:tc>
+                  <a:txBody>
+                    <a:bodyPr/>
+                    <a:lstStyle/>
+                    <a:p>
+                      <a:pPr lvl="0" indent="0" marL="0" algn="l">
+                        <a:buNone/>
+                      </a:pPr>
+                      <a:r>
+                        <a:rPr/>
+                        <a:t>10.03</a:t>
+                      </a:r>
+                    </a:p>
+                  </a:txBody>
+                </a:tc>
+              </a:tr>
+              <a:tr h="0">
+                <a:tc>
+                  <a:txBody>
+                    <a:bodyPr/>
+                    <a:lstStyle/>
+                    <a:p>
+                      <a:pPr lvl="0" indent="0" marL="0" algn="l">
+                        <a:buNone/>
+                      </a:pPr>
+                      <a:r>
+                        <a:rPr/>
+                        <a:t>lagos</a:t>
+                      </a:r>
+                    </a:p>
+                  </a:txBody>
+                </a:tc>
+                <a:tc>
+                  <a:txBody>
+                    <a:bodyPr/>
+                    <a:lstStyle/>
+                    <a:p>
+                      <a:pPr lvl="0" indent="0" marL="0" algn="l">
+                        <a:buNone/>
+                      </a:pPr>
+                      <a:r>
+                        <a:rPr/>
+                        <a:t>existing</a:t>
+                      </a:r>
+                    </a:p>
+                  </a:txBody>
+                </a:tc>
+                <a:tc>
+                  <a:txBody>
+                    <a:bodyPr/>
+                    <a:lstStyle/>
+                    <a:p>
+                      <a:pPr lvl="0" indent="0" marL="0" algn="l">
+                        <a:buNone/>
+                      </a:pPr>
+                      <a:r>
+                        <a:rPr/>
+                        <a:t>lakearea</a:t>
+                      </a:r>
+                    </a:p>
+                  </a:txBody>
+                </a:tc>
+                <a:tc>
+                  <a:txBody>
+                    <a:bodyPr/>
+                    <a:lstStyle/>
+                    <a:p>
+                      <a:pPr lvl="0" indent="0" marL="0" algn="l">
+                        <a:buNone/>
+                      </a:pPr>
+                      <a:r>
+                        <a:rPr/>
+                        <a:t>454.15</a:t>
+                      </a:r>
+                    </a:p>
+                  </a:txBody>
+                </a:tc>
+              </a:tr>
+              <a:tr h="0">
+                <a:tc>
+                  <a:txBody>
+                    <a:bodyPr/>
+                    <a:lstStyle/>
+                    <a:p>
+                      <a:pPr lvl="0" indent="0" marL="0" algn="l">
+                        <a:buNone/>
+                      </a:pPr>
+                      <a:r>
+                        <a:rPr/>
+                        <a:t>nhdplus</a:t>
+                      </a:r>
+                    </a:p>
+                  </a:txBody>
+                </a:tc>
+                <a:tc>
+                  <a:txBody>
+                    <a:bodyPr/>
+                    <a:lstStyle/>
+                    <a:p>
+                      <a:pPr lvl="0" indent="0" marL="0" algn="l">
+                        <a:buNone/>
+                      </a:pPr>
+                      <a:r>
+                        <a:rPr/>
+                        <a:t>existing</a:t>
+                      </a:r>
+                    </a:p>
+                  </a:txBody>
+                </a:tc>
+                <a:tc>
+                  <a:txBody>
+                    <a:bodyPr/>
+                    <a:lstStyle/>
+                    <a:p>
+                      <a:pPr lvl="0" indent="0" marL="0" algn="l">
+                        <a:buNone/>
+                      </a:pPr>
+                      <a:r>
+                        <a:rPr/>
+                        <a:t>meandepth</a:t>
+                      </a:r>
+                    </a:p>
+                  </a:txBody>
+                </a:tc>
+                <a:tc>
+                  <a:txBody>
+                    <a:bodyPr/>
+                    <a:lstStyle/>
+                    <a:p>
+                      <a:pPr lvl="0" indent="0" marL="0" algn="l">
+                        <a:buNone/>
+                      </a:pPr>
+                      <a:r>
+                        <a:rPr/>
+                        <a:t>0.92</a:t>
+                      </a:r>
+                    </a:p>
+                  </a:txBody>
+                </a:tc>
+              </a:tr>
+              <a:tr h="0">
+                <a:tc>
+                  <a:txBody>
+                    <a:bodyPr/>
+                    <a:lstStyle/>
+                    <a:p>
+                      <a:pPr lvl="0" indent="0" marL="0" algn="l">
+                        <a:buNone/>
+                      </a:pPr>
+                      <a:r>
+                        <a:rPr/>
+                        <a:t>nhdplus</a:t>
+                      </a:r>
+                    </a:p>
+                  </a:txBody>
+                </a:tc>
+                <a:tc>
+                  <a:txBody>
+                    <a:bodyPr/>
+                    <a:lstStyle/>
+                    <a:p>
+                      <a:pPr lvl="0" indent="0" marL="0" algn="l">
+                        <a:buNone/>
+                      </a:pPr>
+                      <a:r>
+                        <a:rPr/>
+                        <a:t>existing</a:t>
+                      </a:r>
+                    </a:p>
+                  </a:txBody>
+                </a:tc>
+                <a:tc>
+                  <a:txBody>
+                    <a:bodyPr/>
+                    <a:lstStyle/>
+                    <a:p>
+                      <a:pPr lvl="0" indent="0" marL="0" algn="l">
+                        <a:buNone/>
+                      </a:pPr>
+                      <a:r>
+                        <a:rPr/>
+                        <a:t>lakevolume</a:t>
+                      </a:r>
+                    </a:p>
+                  </a:txBody>
+                </a:tc>
+                <a:tc>
+                  <a:txBody>
+                    <a:bodyPr/>
+                    <a:lstStyle/>
+                    <a:p>
+                      <a:pPr lvl="0" indent="0" marL="0" algn="l">
+                        <a:buNone/>
+                      </a:pPr>
+                      <a:r>
+                        <a:rPr/>
+                        <a:t>3,622,493</a:t>
+                      </a:r>
+                    </a:p>
+                  </a:txBody>
+                </a:tc>
+              </a:tr>
+              <a:tr h="0">
+                <a:tc>
+                  <a:txBody>
+                    <a:bodyPr/>
+                    <a:lstStyle/>
+                    <a:p>
+                      <a:pPr lvl="0" indent="0" marL="0" algn="l">
+                        <a:buNone/>
+                      </a:pPr>
+                      <a:r>
+                        <a:rPr/>
+                        <a:t>nhdplus</a:t>
+                      </a:r>
+                    </a:p>
+                  </a:txBody>
+                </a:tc>
+                <a:tc>
+                  <a:txBody>
+                    <a:bodyPr/>
+                    <a:lstStyle/>
+                    <a:p>
+                      <a:pPr lvl="0" indent="0" marL="0" algn="l">
+                        <a:buNone/>
+                      </a:pPr>
+                      <a:r>
+                        <a:rPr/>
+                        <a:t>existing</a:t>
+                      </a:r>
+                    </a:p>
+                  </a:txBody>
+                </a:tc>
+                <a:tc>
+                  <a:txBody>
+                    <a:bodyPr/>
+                    <a:lstStyle/>
+                    <a:p>
+                      <a:pPr lvl="0" indent="0" marL="0" algn="l">
+                        <a:buNone/>
+                      </a:pPr>
+                      <a:r>
+                        <a:rPr/>
+                        <a:t>maxdepth</a:t>
+                      </a:r>
+                    </a:p>
+                  </a:txBody>
+                </a:tc>
+                <a:tc>
+                  <a:txBody>
+                    <a:bodyPr/>
+                    <a:lstStyle/>
+                    <a:p>
+                      <a:pPr lvl="0" indent="0" marL="0" algn="l">
+                        <a:buNone/>
+                      </a:pPr>
+                      <a:r>
+                        <a:rPr/>
+                        <a:t>3.12</a:t>
+                      </a:r>
+                    </a:p>
+                  </a:txBody>
+                </a:tc>
+              </a:tr>
+              <a:tr h="0">
+                <a:tc>
+                  <a:txBody>
+                    <a:bodyPr/>
+                    <a:lstStyle/>
+                    <a:p>
+                      <a:pPr lvl="0" indent="0" marL="0" algn="l">
+                        <a:buNone/>
+                      </a:pPr>
+                      <a:r>
+                        <a:rPr/>
+                        <a:t>nhdplus</a:t>
+                      </a:r>
+                    </a:p>
+                  </a:txBody>
+                </a:tc>
+                <a:tc>
+                  <a:txBody>
+                    <a:bodyPr/>
+                    <a:lstStyle/>
+                    <a:p>
+                      <a:pPr lvl="0" indent="0" marL="0" algn="l">
+                        <a:buNone/>
+                      </a:pPr>
+                      <a:r>
+                        <a:rPr/>
+                        <a:t>existing</a:t>
+                      </a:r>
+                    </a:p>
+                  </a:txBody>
+                </a:tc>
+                <a:tc>
+                  <a:txBody>
+                    <a:bodyPr/>
+                    <a:lstStyle/>
+                    <a:p>
+                      <a:pPr lvl="0" indent="0" marL="0" algn="l">
+                        <a:buNone/>
+                      </a:pPr>
+                      <a:r>
+                        <a:rPr/>
+                        <a:t>meandused</a:t>
+                      </a:r>
+                    </a:p>
+                  </a:txBody>
+                </a:tc>
+                <a:tc>
+                  <a:txBody>
+                    <a:bodyPr/>
+                    <a:lstStyle/>
+                    <a:p>
+                      <a:pPr lvl="0" indent="0" marL="0" algn="l">
+                        <a:buNone/>
+                      </a:pPr>
+                      <a:r>
+                        <a:rPr/>
+                        <a:t>0.92</a:t>
+                      </a:r>
+                    </a:p>
+                  </a:txBody>
+                </a:tc>
+              </a:tr>
+              <a:tr h="0">
+                <a:tc>
+                  <a:txBody>
+                    <a:bodyPr/>
+                    <a:lstStyle/>
+                    <a:p>
+                      <a:pPr lvl="0" indent="0" marL="0" algn="l">
+                        <a:buNone/>
+                      </a:pPr>
+                      <a:r>
+                        <a:rPr/>
+                        <a:t>nhdplus</a:t>
+                      </a:r>
+                    </a:p>
+                  </a:txBody>
+                </a:tc>
+                <a:tc>
+                  <a:txBody>
+                    <a:bodyPr/>
+                    <a:lstStyle/>
+                    <a:p>
+                      <a:pPr lvl="0" indent="0" marL="0" algn="l">
+                        <a:buNone/>
+                      </a:pPr>
+                      <a:r>
+                        <a:rPr/>
+                        <a:t>existing</a:t>
+                      </a:r>
+                    </a:p>
+                  </a:txBody>
+                </a:tc>
+                <a:tc>
+                  <a:txBody>
+                    <a:bodyPr/>
+                    <a:lstStyle/>
+                    <a:p>
+                      <a:pPr lvl="0" indent="0" marL="0" algn="l">
+                        <a:buNone/>
+                      </a:pPr>
+                      <a:r>
+                        <a:rPr/>
+                        <a:t>meandcode</a:t>
+                      </a:r>
+                    </a:p>
+                  </a:txBody>
+                </a:tc>
+                <a:tc>
+                  <a:txBody>
+                    <a:bodyPr/>
+                    <a:lstStyle/>
+                    <a:p>
+                      <a:pPr lvl="0" indent="0" marL="0" algn="l">
+                        <a:buNone/>
+                      </a:pPr>
+                      <a:r>
+                        <a:rPr/>
+                        <a:t>4.00</a:t>
+                      </a:r>
+                    </a:p>
+                  </a:txBody>
+                </a:tc>
+              </a:tr>
+              <a:tr h="0">
+                <a:tc>
+                  <a:txBody>
+                    <a:bodyPr/>
+                    <a:lstStyle/>
+                    <a:p>
+                      <a:pPr lvl="0" indent="0" marL="0" algn="l">
+                        <a:buNone/>
+                      </a:pPr>
+                      <a:r>
+                        <a:rPr/>
+                        <a:t>nhdplus</a:t>
+                      </a:r>
+                    </a:p>
+                  </a:txBody>
+                </a:tc>
+                <a:tc>
+                  <a:txBody>
+                    <a:bodyPr/>
+                    <a:lstStyle/>
+                    <a:p>
+                      <a:pPr lvl="0" indent="0" marL="0" algn="l">
+                        <a:buNone/>
+                      </a:pPr>
+                      <a:r>
+                        <a:rPr/>
+                        <a:t>existing</a:t>
+                      </a:r>
+                    </a:p>
+                  </a:txBody>
+                </a:tc>
+                <a:tc>
+                  <a:txBody>
+                    <a:bodyPr/>
+                    <a:lstStyle/>
+                    <a:p>
+                      <a:pPr lvl="0" indent="0" marL="0" algn="l">
+                        <a:buNone/>
+                      </a:pPr>
+                      <a:r>
+                        <a:rPr/>
+                        <a:t>lakearea</a:t>
+                      </a:r>
+                    </a:p>
+                  </a:txBody>
+                </a:tc>
+                <a:tc>
+                  <a:txBody>
+                    <a:bodyPr/>
+                    <a:lstStyle/>
+                    <a:p>
+                      <a:pPr lvl="0" indent="0" marL="0" algn="l">
+                        <a:buNone/>
+                      </a:pPr>
+                      <a:r>
+                        <a:rPr/>
+                        <a:t>3,916,293</a:t>
+                      </a:r>
+                    </a:p>
+                  </a:txBody>
+                </a:tc>
+              </a:tr>
+              <a:tr h="0">
+                <a:tc>
+                  <a:txBody>
+                    <a:bodyPr/>
+                    <a:lstStyle/>
+                    <a:p>
+                      <a:pPr lvl="0" indent="0" marL="0" algn="l">
+                        <a:buNone/>
+                      </a:pPr>
+                      <a:r>
+                        <a:rPr/>
+                        <a:t>NLA 2012</a:t>
+                      </a:r>
+                    </a:p>
+                  </a:txBody>
+                </a:tc>
+                <a:tc>
+                  <a:txBody>
+                    <a:bodyPr/>
+                    <a:lstStyle/>
+                    <a:p>
+                      <a:pPr lvl="0" indent="0" marL="0" algn="l">
+                        <a:buNone/>
+                      </a:pPr>
+                      <a:r>
+                        <a:rPr/>
+                        <a:t>existing</a:t>
+                      </a:r>
+                    </a:p>
+                  </a:txBody>
+                </a:tc>
+                <a:tc>
+                  <a:txBody>
+                    <a:bodyPr/>
+                    <a:lstStyle/>
+                    <a:p>
+                      <a:pPr lvl="0" indent="0" marL="0" algn="l">
+                        <a:buNone/>
+                      </a:pPr>
+                      <a:r>
+                        <a:rPr/>
+                        <a:t>index_depth</a:t>
+                      </a:r>
+                    </a:p>
+                  </a:txBody>
+                </a:tc>
+                <a:tc>
+                  <a:txBody>
+                    <a:bodyPr/>
+                    <a:lstStyle/>
+                    <a:p>
+                      <a:pPr lvl="0" indent="0" marL="0" algn="l">
+                        <a:buNone/>
+                      </a:pPr>
+                      <a:r>
+                        <a:rPr/>
+                        <a:t>3.20</a:t>
+                      </a:r>
+                    </a:p>
+                  </a:txBody>
+                </a:tc>
+              </a:tr>
+              <a:tr h="0">
+                <a:tc>
+                  <a:txBody>
+                    <a:bodyPr/>
+                    <a:lstStyle/>
+                    <a:p>
+                      <a:pPr lvl="0" indent="0" marL="0" algn="l">
+                        <a:buNone/>
+                      </a:pPr>
+                      <a:r>
+                        <a:rPr/>
+                        <a:t>NLA 2012</a:t>
+                      </a:r>
+                    </a:p>
+                  </a:txBody>
+                </a:tc>
+                <a:tc>
+                  <a:txBody>
+                    <a:bodyPr/>
+                    <a:lstStyle/>
+                    <a:p>
+                      <a:pPr lvl="0" indent="0" marL="0" algn="l">
+                        <a:buNone/>
+                      </a:pPr>
+                      <a:r>
+                        <a:rPr/>
+                        <a:t>existing</a:t>
+                      </a:r>
+                    </a:p>
+                  </a:txBody>
+                </a:tc>
+                <a:tc>
+                  <a:txBody>
+                    <a:bodyPr/>
+                    <a:lstStyle/>
+                    <a:p>
+                      <a:pPr lvl="0" indent="0" marL="0" algn="l">
+                        <a:buNone/>
+                      </a:pPr>
+                      <a:r>
+                        <a:rPr/>
+                        <a:t>index_depth</a:t>
+                      </a:r>
+                    </a:p>
+                  </a:txBody>
+                </a:tc>
+                <a:tc>
+                  <a:txBody>
+                    <a:bodyPr/>
+                    <a:lstStyle/>
+                    <a:p>
+                      <a:pPr lvl="0" indent="0" marL="0" algn="l">
+                        <a:buNone/>
+                      </a:pPr>
+                      <a:r>
+                        <a:rPr/>
+                        <a:t>3.00</a:t>
+                      </a:r>
+                    </a:p>
+                  </a:txBody>
+                </a:tc>
+              </a:tr>
+              <a:tr h="0">
+                <a:tc>
+                  <a:txBody>
+                    <a:bodyPr/>
+                    <a:lstStyle/>
+                    <a:p>
+                      <a:pPr lvl="0" indent="0" marL="0" algn="l">
+                        <a:buNone/>
+                      </a:pPr>
+                      <a:r>
+                        <a:rPr/>
+                        <a:t>NLA 2017</a:t>
+                      </a:r>
+                    </a:p>
+                  </a:txBody>
+                </a:tc>
+                <a:tc>
+                  <a:txBody>
+                    <a:bodyPr/>
+                    <a:lstStyle/>
+                    <a:p>
+                      <a:pPr lvl="0" indent="0" marL="0" algn="l">
+                        <a:buNone/>
+                      </a:pPr>
+                      <a:r>
+                        <a:rPr/>
+                        <a:t>existing</a:t>
+                      </a:r>
+                    </a:p>
+                  </a:txBody>
+                </a:tc>
+                <a:tc>
+                  <a:txBody>
+                    <a:bodyPr/>
+                    <a:lstStyle/>
+                    <a:p>
+                      <a:pPr lvl="0" indent="0" marL="0" algn="l">
+                        <a:buNone/>
+                      </a:pPr>
+                      <a:r>
+                        <a:rPr/>
+                        <a:t>index_depth</a:t>
+                      </a:r>
+                    </a:p>
+                  </a:txBody>
+                </a:tc>
+                <a:tc>
+                  <a:txBody>
+                    <a:bodyPr/>
+                    <a:lstStyle/>
+                    <a:p>
+                      <a:pPr lvl="0" indent="0" marL="0" algn="l">
+                        <a:buNone/>
+                      </a:pPr>
+                      <a:r>
+                        <a:rPr/>
+                        <a:t>3.30</a:t>
+                      </a:r>
+                    </a:p>
+                  </a:txBody>
+                </a:tc>
+              </a:tr>
+              <a:tr h="0">
+                <a:tc>
+                  <a:txBody>
+                    <a:bodyPr/>
+                    <a:lstStyle/>
+                    <a:p>
+                      <a:pPr lvl="0" indent="0" marL="0" algn="l">
+                        <a:buNone/>
+                      </a:pPr>
+                      <a:r>
+                        <a:rPr/>
+                        <a:t>surge_morpho</a:t>
+                      </a:r>
+                    </a:p>
+                  </a:txBody>
+                </a:tc>
+                <a:tc>
+                  <a:txBody>
+                    <a:bodyPr/>
+                    <a:lstStyle/>
+                    <a:p>
+                      <a:pPr lvl="0" indent="0" marL="0" algn="l">
+                        <a:buNone/>
+                      </a:pPr>
+                      <a:r>
+                        <a:rPr/>
+                        <a:t>calculated</a:t>
+                      </a:r>
+                    </a:p>
+                  </a:txBody>
+                </a:tc>
+                <a:tc>
+                  <a:txBody>
+                    <a:bodyPr/>
+                    <a:lstStyle/>
+                    <a:p>
+                      <a:pPr lvl="0" indent="0" marL="0" algn="l">
+                        <a:buNone/>
+                      </a:pPr>
+                      <a:r>
+                        <a:rPr/>
+                        <a:t>surfacearea</a:t>
+                      </a:r>
+                    </a:p>
+                  </a:txBody>
+                </a:tc>
+                <a:tc>
+                  <a:txBody>
+                    <a:bodyPr/>
+                    <a:lstStyle/>
+                    <a:p>
+                      <a:pPr lvl="0" indent="0" marL="0" algn="l">
+                        <a:buNone/>
+                      </a:pPr>
+                      <a:r>
+                        <a:rPr/>
+                        <a:t>4,234,663</a:t>
+                      </a:r>
+                    </a:p>
+                  </a:txBody>
+                </a:tc>
+              </a:tr>
+              <a:tr h="0">
+                <a:tc>
+                  <a:txBody>
+                    <a:bodyPr/>
+                    <a:lstStyle/>
+                    <a:p>
+                      <a:pPr lvl="0" indent="0" marL="0" algn="l">
+                        <a:buNone/>
+                      </a:pPr>
+                      <a:r>
+                        <a:rPr/>
+                        <a:t>surge_morpho</a:t>
+                      </a:r>
+                    </a:p>
+                  </a:txBody>
+                </a:tc>
+                <a:tc>
+                  <a:txBody>
+                    <a:bodyPr/>
+                    <a:lstStyle/>
+                    <a:p>
+                      <a:pPr lvl="0" indent="0" marL="0" algn="l">
+                        <a:buNone/>
+                      </a:pPr>
+                      <a:r>
+                        <a:rPr/>
+                        <a:t>calculated</a:t>
+                      </a:r>
+                    </a:p>
+                  </a:txBody>
+                </a:tc>
+                <a:tc>
+                  <a:txBody>
+                    <a:bodyPr/>
+                    <a:lstStyle/>
+                    <a:p>
+                      <a:pPr lvl="0" indent="0" marL="0" algn="l">
+                        <a:buNone/>
+                      </a:pPr>
+                      <a:r>
+                        <a:rPr/>
+                        <a:t>shorelinelength</a:t>
+                      </a:r>
+                    </a:p>
+                  </a:txBody>
+                </a:tc>
+                <a:tc>
+                  <a:txBody>
+                    <a:bodyPr/>
+                    <a:lstStyle/>
+                    <a:p>
+                      <a:pPr lvl="0" indent="0" marL="0" algn="l">
+                        <a:buNone/>
+                      </a:pPr>
+                      <a:r>
+                        <a:rPr/>
+                        <a:t>37,291</a:t>
+                      </a:r>
+                    </a:p>
+                  </a:txBody>
+                </a:tc>
+              </a:tr>
+              <a:tr h="0">
+                <a:tc>
+                  <a:txBody>
+                    <a:bodyPr/>
+                    <a:lstStyle/>
+                    <a:p>
+                      <a:pPr lvl="0" indent="0" marL="0" algn="l">
+                        <a:buNone/>
+                      </a:pPr>
+                      <a:r>
+                        <a:rPr/>
+                        <a:t>surge_morpho</a:t>
+                      </a:r>
+                    </a:p>
+                  </a:txBody>
+                </a:tc>
+                <a:tc>
+                  <a:txBody>
+                    <a:bodyPr/>
+                    <a:lstStyle/>
+                    <a:p>
+                      <a:pPr lvl="0" indent="0" marL="0" algn="l">
+                        <a:buNone/>
+                      </a:pPr>
+                      <a:r>
+                        <a:rPr/>
+                        <a:t>calculated</a:t>
+                      </a:r>
+                    </a:p>
+                  </a:txBody>
+                </a:tc>
+                <a:tc>
+                  <a:txBody>
+                    <a:bodyPr/>
+                    <a:lstStyle/>
+                    <a:p>
+                      <a:pPr lvl="0" indent="0" marL="0" algn="l">
+                        <a:buNone/>
+                      </a:pPr>
+                      <a:r>
+                        <a:rPr/>
+                        <a:t>shorelinedevelopment</a:t>
+                      </a:r>
+                    </a:p>
+                  </a:txBody>
+                </a:tc>
+                <a:tc>
+                  <a:txBody>
+                    <a:bodyPr/>
+                    <a:lstStyle/>
+                    <a:p>
+                      <a:pPr lvl="0" indent="0" marL="0" algn="l">
+                        <a:buNone/>
+                      </a:pPr>
+                      <a:r>
+                        <a:rPr/>
+                        <a:t>5.11</a:t>
+                      </a:r>
+                    </a:p>
+                  </a:txBody>
+                </a:tc>
+              </a:tr>
+              <a:tr h="0">
+                <a:tc>
+                  <a:txBody>
+                    <a:bodyPr/>
+                    <a:lstStyle/>
+                    <a:p>
+                      <a:pPr lvl="0" indent="0" marL="0" algn="l">
+                        <a:buNone/>
+                      </a:pPr>
+                      <a:r>
+                        <a:rPr/>
+                        <a:t>surge_morpho</a:t>
+                      </a:r>
+                    </a:p>
+                  </a:txBody>
+                </a:tc>
+                <a:tc>
+                  <a:txBody>
+                    <a:bodyPr/>
+                    <a:lstStyle/>
+                    <a:p>
+                      <a:pPr lvl="0" indent="0" marL="0" algn="l">
+                        <a:buNone/>
+                      </a:pPr>
+                      <a:r>
+                        <a:rPr/>
+                        <a:t>calculated</a:t>
+                      </a:r>
+                    </a:p>
+                  </a:txBody>
+                </a:tc>
+                <a:tc>
+                  <a:txBody>
+                    <a:bodyPr/>
+                    <a:lstStyle/>
+                    <a:p>
+                      <a:pPr lvl="0" indent="0" marL="0" algn="l">
+                        <a:buNone/>
+                      </a:pPr>
+                      <a:r>
+                        <a:rPr/>
+                        <a:t>maxdepth</a:t>
+                      </a:r>
+                    </a:p>
+                  </a:txBody>
+                </a:tc>
+                <a:tc>
+                  <a:txBody>
+                    <a:bodyPr/>
+                    <a:lstStyle/>
+                    <a:p>
+                      <a:pPr lvl="0" indent="0" marL="0" algn="l">
+                        <a:buNone/>
+                      </a:pPr>
+                      <a:r>
+                        <a:rPr/>
+                        <a:t>7.96</a:t>
+                      </a:r>
+                    </a:p>
+                  </a:txBody>
+                </a:tc>
+              </a:tr>
+              <a:tr h="0">
+                <a:tc>
+                  <a:txBody>
+                    <a:bodyPr/>
+                    <a:lstStyle/>
+                    <a:p>
+                      <a:pPr lvl="0" indent="0" marL="0" algn="l">
+                        <a:buNone/>
+                      </a:pPr>
+                      <a:r>
+                        <a:rPr/>
+                        <a:t>surge_morpho</a:t>
+                      </a:r>
+                    </a:p>
+                  </a:txBody>
+                </a:tc>
+                <a:tc>
+                  <a:txBody>
+                    <a:bodyPr/>
+                    <a:lstStyle/>
+                    <a:p>
+                      <a:pPr lvl="0" indent="0" marL="0" algn="l">
+                        <a:buNone/>
+                      </a:pPr>
+                      <a:r>
+                        <a:rPr/>
+                        <a:t>calculated</a:t>
+                      </a:r>
+                    </a:p>
+                  </a:txBody>
+                </a:tc>
+                <a:tc>
+                  <a:txBody>
+                    <a:bodyPr/>
+                    <a:lstStyle/>
+                    <a:p>
+                      <a:pPr lvl="0" indent="0" marL="0" algn="l">
+                        <a:buNone/>
+                      </a:pPr>
+                      <a:r>
+                        <a:rPr/>
+                        <a:t>volume</a:t>
+                      </a:r>
+                    </a:p>
+                  </a:txBody>
+                </a:tc>
+                <a:tc>
+                  <a:txBody>
+                    <a:bodyPr/>
+                    <a:lstStyle/>
+                    <a:p>
+                      <a:pPr lvl="0" indent="0" marL="0" algn="l">
+                        <a:buNone/>
+                      </a:pPr>
+                      <a:r>
+                        <a:rPr/>
+                        <a:t>9,872,807</a:t>
+                      </a:r>
+                    </a:p>
+                  </a:txBody>
+                </a:tc>
+              </a:tr>
+              <a:tr h="0">
+                <a:tc>
+                  <a:txBody>
+                    <a:bodyPr/>
+                    <a:lstStyle/>
+                    <a:p>
+                      <a:pPr lvl="0" indent="0" marL="0" algn="l">
+                        <a:buNone/>
+                      </a:pPr>
+                      <a:r>
+                        <a:rPr/>
+                        <a:t>surge_morpho</a:t>
+                      </a:r>
+                    </a:p>
+                  </a:txBody>
+                </a:tc>
+                <a:tc>
+                  <a:txBody>
+                    <a:bodyPr/>
+                    <a:lstStyle/>
+                    <a:p>
+                      <a:pPr lvl="0" indent="0" marL="0" algn="l">
+                        <a:buNone/>
+                      </a:pPr>
+                      <a:r>
+                        <a:rPr/>
+                        <a:t>calculated</a:t>
+                      </a:r>
+                    </a:p>
+                  </a:txBody>
+                </a:tc>
+                <a:tc>
+                  <a:txBody>
+                    <a:bodyPr/>
+                    <a:lstStyle/>
+                    <a:p>
+                      <a:pPr lvl="0" indent="0" marL="0" algn="l">
+                        <a:buNone/>
+                      </a:pPr>
+                      <a:r>
+                        <a:rPr/>
+                        <a:t>meandepth</a:t>
+                      </a:r>
+                    </a:p>
+                  </a:txBody>
+                </a:tc>
+                <a:tc>
+                  <a:txBody>
+                    <a:bodyPr/>
+                    <a:lstStyle/>
+                    <a:p>
+                      <a:pPr lvl="0" indent="0" marL="0" algn="l">
+                        <a:buNone/>
+                      </a:pPr>
+                      <a:r>
+                        <a:rPr/>
+                        <a:t>2.33</a:t>
+                      </a:r>
+                    </a:p>
+                  </a:txBody>
+                </a:tc>
+              </a:tr>
+              <a:tr h="0">
+                <a:tc>
+                  <a:txBody>
+                    <a:bodyPr/>
+                    <a:lstStyle/>
+                    <a:p>
+                      <a:pPr lvl="0" indent="0" marL="0" algn="l">
+                        <a:buNone/>
+                      </a:pPr>
+                      <a:r>
+                        <a:rPr/>
+                        <a:t>surge_morpho</a:t>
+                      </a:r>
+                    </a:p>
+                  </a:txBody>
+                </a:tc>
+                <a:tc>
+                  <a:txBody>
+                    <a:bodyPr/>
+                    <a:lstStyle/>
+                    <a:p>
+                      <a:pPr lvl="0" indent="0" marL="0" algn="l">
+                        <a:buNone/>
+                      </a:pPr>
+                      <a:r>
+                        <a:rPr/>
+                        <a:t>calculated</a:t>
+                      </a:r>
+                    </a:p>
+                  </a:txBody>
+                </a:tc>
+                <a:tc>
+                  <a:txBody>
+                    <a:bodyPr/>
+                    <a:lstStyle/>
+                    <a:p>
+                      <a:pPr lvl="0" indent="0" marL="0" algn="l">
+                        <a:buNone/>
+                      </a:pPr>
+                      <a:r>
+                        <a:rPr/>
+                        <a:t>maxwidth</a:t>
+                      </a:r>
+                    </a:p>
+                  </a:txBody>
+                </a:tc>
+                <a:tc>
+                  <a:txBody>
+                    <a:bodyPr/>
+                    <a:lstStyle/>
+                    <a:p>
+                      <a:pPr lvl="0" indent="0" marL="0" algn="l">
+                        <a:buNone/>
+                      </a:pPr>
+                      <a:r>
+                        <a:rPr/>
+                        <a:t>1,194.47</a:t>
+                      </a:r>
+                    </a:p>
+                  </a:txBody>
+                </a:tc>
+              </a:tr>
+              <a:tr h="0">
+                <a:tc>
+                  <a:txBody>
+                    <a:bodyPr/>
+                    <a:lstStyle/>
+                    <a:p>
+                      <a:pPr lvl="0" indent="0" marL="0" algn="l">
+                        <a:buNone/>
+                      </a:pPr>
+                      <a:r>
+                        <a:rPr/>
+                        <a:t>surge_morpho</a:t>
+                      </a:r>
+                    </a:p>
+                  </a:txBody>
+                </a:tc>
+                <a:tc>
+                  <a:txBody>
+                    <a:bodyPr/>
+                    <a:lstStyle/>
+                    <a:p>
+                      <a:pPr lvl="0" indent="0" marL="0" algn="l">
+                        <a:buNone/>
+                      </a:pPr>
+                      <a:r>
+                        <a:rPr/>
+                        <a:t>calculated</a:t>
+                      </a:r>
+                    </a:p>
+                  </a:txBody>
+                </a:tc>
+                <a:tc>
+                  <a:txBody>
+                    <a:bodyPr/>
+                    <a:lstStyle/>
+                    <a:p>
+                      <a:pPr lvl="0" indent="0" marL="0" algn="l">
+                        <a:buNone/>
+                      </a:pPr>
+                      <a:r>
+                        <a:rPr/>
+                        <a:t>meanwidth</a:t>
+                      </a:r>
+                    </a:p>
+                  </a:txBody>
+                </a:tc>
+                <a:tc>
+                  <a:txBody>
+                    <a:bodyPr/>
+                    <a:lstStyle/>
+                    <a:p>
+                      <a:pPr lvl="0" indent="0" marL="0" algn="l">
+                        <a:buNone/>
+                      </a:pPr>
+                      <a:r>
+                        <a:rPr/>
+                        <a:t>1,021.15</a:t>
+                      </a:r>
+                    </a:p>
+                  </a:txBody>
+                </a:tc>
+              </a:tr>
+              <a:tr h="0">
+                <a:tc>
+                  <a:txBody>
+                    <a:bodyPr/>
+                    <a:lstStyle/>
+                    <a:p>
+                      <a:pPr lvl="0" indent="0" marL="0" algn="l">
+                        <a:buNone/>
+                      </a:pPr>
+                      <a:r>
+                        <a:rPr/>
+                        <a:t>surge_morpho</a:t>
+                      </a:r>
+                    </a:p>
+                  </a:txBody>
+                </a:tc>
+                <a:tc>
+                  <a:txBody>
+                    <a:bodyPr/>
+                    <a:lstStyle/>
+                    <a:p>
+                      <a:pPr lvl="0" indent="0" marL="0" algn="l">
+                        <a:buNone/>
+                      </a:pPr>
+                      <a:r>
+                        <a:rPr/>
+                        <a:t>calculated</a:t>
+                      </a:r>
+                    </a:p>
+                  </a:txBody>
+                </a:tc>
+                <a:tc>
+                  <a:txBody>
+                    <a:bodyPr/>
+                    <a:lstStyle/>
+                    <a:p>
+                      <a:pPr lvl="0" indent="0" marL="0" algn="l">
+                        <a:buNone/>
+                      </a:pPr>
+                      <a:r>
+                        <a:rPr/>
+                        <a:t>fetch</a:t>
+                      </a:r>
+                    </a:p>
+                  </a:txBody>
+                </a:tc>
+                <a:tc>
+                  <a:txBody>
+                    <a:bodyPr/>
+                    <a:lstStyle/>
+                    <a:p>
+                      <a:pPr lvl="0" indent="0" marL="0" algn="l">
+                        <a:buNone/>
+                      </a:pPr>
+                      <a:r>
+                        <a:rPr/>
+                        <a:t>2,157.67</a:t>
+                      </a:r>
+                    </a:p>
+                  </a:txBody>
+                </a:tc>
+              </a:tr>
+              <a:tr h="0">
+                <a:tc>
+                  <a:txBody>
+                    <a:bodyPr/>
+                    <a:lstStyle/>
+                    <a:p>
+                      <a:pPr lvl="0" indent="0" marL="0" algn="l">
+                        <a:buNone/>
+                      </a:pPr>
+                      <a:r>
+                        <a:rPr/>
+                        <a:t>surge_morpho</a:t>
+                      </a:r>
+                    </a:p>
+                  </a:txBody>
+                </a:tc>
+                <a:tc>
+                  <a:txBody>
+                    <a:bodyPr/>
+                    <a:lstStyle/>
+                    <a:p>
+                      <a:pPr lvl="0" indent="0" marL="0" algn="l">
+                        <a:buNone/>
+                      </a:pPr>
+                      <a:r>
+                        <a:rPr/>
+                        <a:t>calculated</a:t>
+                      </a:r>
+                    </a:p>
+                  </a:txBody>
+                </a:tc>
+                <a:tc>
+                  <a:txBody>
+                    <a:bodyPr/>
+                    <a:lstStyle/>
+                    <a:p>
+                      <a:pPr lvl="0" indent="0" marL="0" algn="l">
+                        <a:buNone/>
+                      </a:pPr>
+                      <a:r>
+                        <a:rPr/>
+                        <a:t>maxlength</a:t>
+                      </a:r>
+                    </a:p>
+                  </a:txBody>
+                </a:tc>
+                <a:tc>
+                  <a:txBody>
+                    <a:bodyPr/>
+                    <a:lstStyle/>
+                    <a:p>
+                      <a:pPr lvl="0" indent="0" marL="0" algn="l">
+                        <a:buNone/>
+                      </a:pPr>
+                      <a:r>
+                        <a:rPr/>
+                        <a:t>4,464.33</a:t>
+                      </a:r>
+                    </a:p>
+                  </a:txBody>
+                </a:tc>
+              </a:tr>
+              <a:tr h="0">
+                <a:tc>
+                  <a:txBody>
+                    <a:bodyPr/>
+                    <a:lstStyle/>
+                    <a:p>
+                      <a:pPr lvl="0" indent="0" marL="0" algn="l">
+                        <a:buNone/>
+                      </a:pPr>
+                      <a:r>
+                        <a:rPr/>
+                        <a:t>globathy</a:t>
+                      </a:r>
+                    </a:p>
+                  </a:txBody>
+                </a:tc>
+                <a:tc>
+                  <a:txBody>
+                    <a:bodyPr/>
+                    <a:lstStyle/>
+                    <a:p>
+                      <a:pPr lvl="0" indent="0" marL="0" algn="l">
+                        <a:buNone/>
+                      </a:pPr>
+                      <a:r>
+                        <a:rPr/>
+                        <a:t>existing</a:t>
+                      </a:r>
+                    </a:p>
+                  </a:txBody>
+                </a:tc>
+                <a:tc>
+                  <a:txBody>
+                    <a:bodyPr/>
+                    <a:lstStyle/>
+                    <a:p>
+                      <a:pPr lvl="0" indent="0" marL="0" algn="l">
+                        <a:buNone/>
+                      </a:pPr>
+                      <a:r>
+                        <a:rPr/>
+                        <a:t>dmax_use</a:t>
+                      </a:r>
+                    </a:p>
+                  </a:txBody>
+                </a:tc>
+                <a:tc>
+                  <a:txBody>
+                    <a:bodyPr/>
+                    <a:lstStyle/>
+                    <a:p>
+                      <a:pPr lvl="0" indent="0" marL="0" algn="l">
+                        <a:buNone/>
+                      </a:pPr>
+                      <a:r>
+                        <a:rPr/>
+                        <a:t>20.22</a:t>
+                      </a:r>
+                    </a:p>
+                  </a:txBody>
+                </a:tc>
+              </a:tr>
+            </a:tbl>
+          </a:graphicData>
+        </a:graphic>
+      </p:graphicFrame>
     </p:spTree>
   </p:cSld>
 </p:sld>

</xml_diff>